<commit_message>
pushing complete project files
</commit_message>
<xml_diff>
--- a/Project Documents/Bank App Security Exploration.pptx
+++ b/Project Documents/Bank App Security Exploration.pptx
@@ -12555,15 +12555,7 @@
             <a:pPr lvl="1"/>
             <a:r>
               <a:rPr lang="en-US" dirty="0"/>
-              <a:t>Utilize </a:t>
-            </a:r>
-            <a:r>
-              <a:rPr lang="en-US" dirty="0" err="1"/>
-              <a:t>Asp.Net</a:t>
-            </a:r>
-            <a:r>
-              <a:rPr lang="en-US" dirty="0"/>
-              <a:t> function attributes to prevent unauthorized access to certain regions and mitigate CSRF</a:t>
+              <a:t>Utilize Asp.Net function attributes to prevent unauthorized access to certain regions and mitigate CSRF</a:t>
             </a:r>
           </a:p>
           <a:p>

</xml_diff>